<commit_message>
Committing minor changes made, mostly to work through my rust removal phase.
</commit_message>
<xml_diff>
--- a/ANA500_Micro-Project_HousingPricePrediction.pptx
+++ b/ANA500_Micro-Project_HousingPricePrediction.pptx
@@ -5,26 +5,27 @@
     <p:sldMasterId id="2147483648" r:id="rId1"/>
   </p:sldMasterIdLst>
   <p:notesMasterIdLst>
-    <p:notesMasterId r:id="rId19"/>
+    <p:notesMasterId r:id="rId20"/>
   </p:notesMasterIdLst>
   <p:sldIdLst>
     <p:sldId id="256" r:id="rId2"/>
     <p:sldId id="257" r:id="rId3"/>
     <p:sldId id="258" r:id="rId4"/>
-    <p:sldId id="265" r:id="rId5"/>
-    <p:sldId id="266" r:id="rId6"/>
-    <p:sldId id="267" r:id="rId7"/>
-    <p:sldId id="268" r:id="rId8"/>
-    <p:sldId id="269" r:id="rId9"/>
-    <p:sldId id="270" r:id="rId10"/>
-    <p:sldId id="259" r:id="rId11"/>
-    <p:sldId id="264" r:id="rId12"/>
-    <p:sldId id="260" r:id="rId13"/>
-    <p:sldId id="271" r:id="rId14"/>
-    <p:sldId id="272" r:id="rId15"/>
-    <p:sldId id="261" r:id="rId16"/>
-    <p:sldId id="262" r:id="rId17"/>
-    <p:sldId id="263" r:id="rId18"/>
+    <p:sldId id="273" r:id="rId5"/>
+    <p:sldId id="265" r:id="rId6"/>
+    <p:sldId id="266" r:id="rId7"/>
+    <p:sldId id="267" r:id="rId8"/>
+    <p:sldId id="268" r:id="rId9"/>
+    <p:sldId id="269" r:id="rId10"/>
+    <p:sldId id="270" r:id="rId11"/>
+    <p:sldId id="259" r:id="rId12"/>
+    <p:sldId id="264" r:id="rId13"/>
+    <p:sldId id="260" r:id="rId14"/>
+    <p:sldId id="271" r:id="rId15"/>
+    <p:sldId id="272" r:id="rId16"/>
+    <p:sldId id="261" r:id="rId17"/>
+    <p:sldId id="262" r:id="rId18"/>
+    <p:sldId id="263" r:id="rId19"/>
   </p:sldIdLst>
   <p:sldSz cx="12192000" cy="6858000"/>
   <p:notesSz cx="6858000" cy="9144000"/>
@@ -134,7 +135,7 @@
 <file path=ppt/revisionInfo.xml><?xml version="1.0" encoding="utf-8"?>
 <p1510:revInfo xmlns:a="http://schemas.openxmlformats.org/drawingml/2006/main" xmlns:r="http://schemas.openxmlformats.org/officeDocument/2006/relationships" xmlns:p1510="http://schemas.microsoft.com/office/powerpoint/2015/10/main">
   <p1510:revLst>
-    <p1510:client id="{0BDDE687-3B87-46B8-AF79-599D3157261D}" v="551" dt="2022-09-29T04:12:32.513"/>
+    <p1510:client id="{0BDDE687-3B87-46B8-AF79-599D3157261D}" v="552" dt="2023-01-25T18:14:12.448"/>
   </p1510:revLst>
 </p1510:revInfo>
 </file>
@@ -144,7 +145,7 @@
   <pc:docChgLst>
     <pc:chgData name="Emmanuel J Rodriguez" userId="2e21cfcd93492766" providerId="LiveId" clId="{0BDDE687-3B87-46B8-AF79-599D3157261D}"/>
     <pc:docChg chg="undo custSel addSld delSld modSld addSection delSection">
-      <pc:chgData name="Emmanuel J Rodriguez" userId="2e21cfcd93492766" providerId="LiveId" clId="{0BDDE687-3B87-46B8-AF79-599D3157261D}" dt="2022-09-30T01:59:37.527" v="4396" actId="20577"/>
+      <pc:chgData name="Emmanuel J Rodriguez" userId="2e21cfcd93492766" providerId="LiveId" clId="{0BDDE687-3B87-46B8-AF79-599D3157261D}" dt="2023-01-25T18:14:12.447" v="4397"/>
       <pc:docMkLst>
         <pc:docMk/>
       </pc:docMkLst>
@@ -784,6 +785,13 @@
           </ac:picMkLst>
         </pc:picChg>
       </pc:sldChg>
+      <pc:sldChg chg="add">
+        <pc:chgData name="Emmanuel J Rodriguez" userId="2e21cfcd93492766" providerId="LiveId" clId="{0BDDE687-3B87-46B8-AF79-599D3157261D}" dt="2023-01-25T18:14:12.447" v="4397"/>
+        <pc:sldMkLst>
+          <pc:docMk/>
+          <pc:sldMk cId="3507078451" sldId="273"/>
+        </pc:sldMkLst>
+      </pc:sldChg>
     </pc:docChg>
   </pc:docChgLst>
 </pc:chgInfo>
@@ -871,7 +879,7 @@
           <a:p>
             <a:fld id="{A33DA6DB-7A40-4C88-9F43-9745FE5D46F6}" type="datetimeFigureOut">
               <a:rPr lang="en-US" smtClean="0"/>
-              <a:t>9/23/2022</a:t>
+              <a:t>1/25/2023</a:t>
             </a:fld>
             <a:endParaRPr lang="en-US"/>
           </a:p>
@@ -1539,7 +1547,7 @@
           <a:p>
             <a:fld id="{44A5D45A-D45F-424F-844F-2FDB359652C0}" type="datetime1">
               <a:rPr lang="en-US" smtClean="0"/>
-              <a:t>9/23/2022</a:t>
+              <a:t>1/25/2023</a:t>
             </a:fld>
             <a:endParaRPr lang="en-US"/>
           </a:p>
@@ -1740,7 +1748,7 @@
           <a:p>
             <a:fld id="{17F462BE-1DDC-43BE-971D-B0777C8395E2}" type="datetime1">
               <a:rPr lang="en-US" smtClean="0"/>
-              <a:t>9/23/2022</a:t>
+              <a:t>1/25/2023</a:t>
             </a:fld>
             <a:endParaRPr lang="en-US"/>
           </a:p>
@@ -1951,7 +1959,7 @@
           <a:p>
             <a:fld id="{10A21AE1-EEE3-491C-AC58-AE80755D02A6}" type="datetime1">
               <a:rPr lang="en-US" smtClean="0"/>
-              <a:t>9/23/2022</a:t>
+              <a:t>1/25/2023</a:t>
             </a:fld>
             <a:endParaRPr lang="en-US"/>
           </a:p>
@@ -2152,7 +2160,7 @@
           <a:p>
             <a:fld id="{7E206773-0001-4F4B-8086-9F14B8F91603}" type="datetime1">
               <a:rPr lang="en-US" smtClean="0"/>
-              <a:t>9/23/2022</a:t>
+              <a:t>1/25/2023</a:t>
             </a:fld>
             <a:endParaRPr lang="en-US"/>
           </a:p>
@@ -2430,7 +2438,7 @@
           <a:p>
             <a:fld id="{97DC865C-92D2-4319-96D1-1D99A481FABF}" type="datetime1">
               <a:rPr lang="en-US" smtClean="0"/>
-              <a:t>9/23/2022</a:t>
+              <a:t>1/25/2023</a:t>
             </a:fld>
             <a:endParaRPr lang="en-US"/>
           </a:p>
@@ -2698,7 +2706,7 @@
           <a:p>
             <a:fld id="{E3B6DAFB-5E9E-491B-AF31-90A73318DFC7}" type="datetime1">
               <a:rPr lang="en-US" smtClean="0"/>
-              <a:t>9/23/2022</a:t>
+              <a:t>1/25/2023</a:t>
             </a:fld>
             <a:endParaRPr lang="en-US"/>
           </a:p>
@@ -3113,7 +3121,7 @@
           <a:p>
             <a:fld id="{2E836AED-7843-495F-905B-F0EB68BCF8C9}" type="datetime1">
               <a:rPr lang="en-US" smtClean="0"/>
-              <a:t>9/23/2022</a:t>
+              <a:t>1/25/2023</a:t>
             </a:fld>
             <a:endParaRPr lang="en-US"/>
           </a:p>
@@ -3257,7 +3265,7 @@
           <a:p>
             <a:fld id="{EB64036E-C719-4A7B-A619-9A27E1A3B8FB}" type="datetime1">
               <a:rPr lang="en-US" smtClean="0"/>
-              <a:t>9/23/2022</a:t>
+              <a:t>1/25/2023</a:t>
             </a:fld>
             <a:endParaRPr lang="en-US"/>
           </a:p>
@@ -3373,7 +3381,7 @@
           <a:p>
             <a:fld id="{74BF6456-5947-4D29-8DEE-FB884939A2CE}" type="datetime1">
               <a:rPr lang="en-US" smtClean="0"/>
-              <a:t>9/23/2022</a:t>
+              <a:t>1/25/2023</a:t>
             </a:fld>
             <a:endParaRPr lang="en-US"/>
           </a:p>
@@ -3687,7 +3695,7 @@
           <a:p>
             <a:fld id="{B35B87D6-AC31-4810-9065-5BD18E068A7A}" type="datetime1">
               <a:rPr lang="en-US" smtClean="0"/>
-              <a:t>9/23/2022</a:t>
+              <a:t>1/25/2023</a:t>
             </a:fld>
             <a:endParaRPr lang="en-US"/>
           </a:p>
@@ -3978,7 +3986,7 @@
           <a:p>
             <a:fld id="{894F0851-7CF8-44AC-95B4-E58A8135E43A}" type="datetime1">
               <a:rPr lang="en-US" smtClean="0"/>
-              <a:t>9/23/2022</a:t>
+              <a:t>1/25/2023</a:t>
             </a:fld>
             <a:endParaRPr lang="en-US"/>
           </a:p>
@@ -4222,7 +4230,7 @@
           <a:p>
             <a:fld id="{37D0CB31-04C3-4AB5-9AEF-1816F6E15762}" type="datetime1">
               <a:rPr lang="en-US" smtClean="0"/>
-              <a:t>9/23/2022</a:t>
+              <a:t>1/25/2023</a:t>
             </a:fld>
             <a:endParaRPr lang="en-US"/>
           </a:p>
@@ -4847,146 +4855,8 @@
           <a:p>
             <a:r>
               <a:rPr lang="en-US" dirty="0"/>
-              <a:t>Acquire</a:t>
-            </a:r>
-          </a:p>
-        </p:txBody>
-      </p:sp>
-      <p:sp>
-        <p:nvSpPr>
-          <p:cNvPr id="3" name="Content Placeholder 2">
-            <a:extLst>
-              <a:ext uri="{FF2B5EF4-FFF2-40B4-BE49-F238E27FC236}">
-                <a16:creationId xmlns:a16="http://schemas.microsoft.com/office/drawing/2014/main" id="{7FEAE391-6366-4E20-A14E-0ECFAEA8029A}"/>
-              </a:ext>
-            </a:extLst>
-          </p:cNvPr>
-          <p:cNvSpPr>
-            <a:spLocks noGrp="1"/>
-          </p:cNvSpPr>
-          <p:nvPr>
-            <p:ph idx="1"/>
-          </p:nvPr>
-        </p:nvSpPr>
-        <p:spPr/>
-        <p:txBody>
-          <a:bodyPr/>
-          <a:lstStyle/>
-          <a:p>
-            <a:r>
-              <a:rPr lang="en-US" sz="2400" dirty="0">
-                <a:solidFill>
-                  <a:srgbClr val="000000"/>
-                </a:solidFill>
-                <a:effectLst/>
-                <a:latin typeface="Times New Roman" panose="02020603050405020304" pitchFamily="18" charset="0"/>
-                <a:ea typeface="Times New Roman" panose="02020603050405020304" pitchFamily="18" charset="0"/>
-              </a:rPr>
-              <a:t>Housing sales data was ac</a:t>
-            </a:r>
-            <a:r>
-              <a:rPr lang="en-US" sz="2400" dirty="0">
-                <a:solidFill>
-                  <a:srgbClr val="000000"/>
-                </a:solidFill>
-                <a:latin typeface="Times New Roman" panose="02020603050405020304" pitchFamily="18" charset="0"/>
-                <a:ea typeface="Times New Roman" panose="02020603050405020304" pitchFamily="18" charset="0"/>
-              </a:rPr>
-              <a:t>quired through Kaggle.com, which is a popular place for data scientists, machine learning practitioners, engineers, and data scientists to post projects, participate in data science competitions and acquire open-source datasets.</a:t>
-            </a:r>
-          </a:p>
-          <a:p>
-            <a:pPr lvl="1"/>
-            <a:r>
-              <a:rPr lang="en-US" sz="2000" dirty="0">
-                <a:solidFill>
-                  <a:srgbClr val="000000"/>
-                </a:solidFill>
-                <a:latin typeface="Times New Roman" panose="02020603050405020304" pitchFamily="18" charset="0"/>
-                <a:ea typeface="Times New Roman" panose="02020603050405020304" pitchFamily="18" charset="0"/>
-              </a:rPr>
-              <a:t>Data source: </a:t>
-            </a:r>
-            <a:r>
-              <a:rPr lang="en-US" sz="2000" dirty="0">
-                <a:solidFill>
-                  <a:srgbClr val="000000"/>
-                </a:solidFill>
-                <a:latin typeface="Times New Roman" panose="02020603050405020304" pitchFamily="18" charset="0"/>
-                <a:ea typeface="Times New Roman" panose="02020603050405020304" pitchFamily="18" charset="0"/>
-                <a:hlinkClick r:id="rId2"/>
-              </a:rPr>
-              <a:t>https://www.kaggle.com/datasets/vallabhadattap/kingcountyhousing?select=KC_housing_data.csv</a:t>
-            </a:r>
-            <a:endParaRPr lang="en-US" sz="2000" dirty="0">
-              <a:solidFill>
-                <a:srgbClr val="000000"/>
-              </a:solidFill>
-              <a:latin typeface="Times New Roman" panose="02020603050405020304" pitchFamily="18" charset="0"/>
-              <a:ea typeface="Times New Roman" panose="02020603050405020304" pitchFamily="18" charset="0"/>
-            </a:endParaRPr>
-          </a:p>
-          <a:p>
-            <a:r>
-              <a:rPr lang="en-US" sz="2400" dirty="0">
-                <a:solidFill>
-                  <a:srgbClr val="000000"/>
-                </a:solidFill>
-                <a:latin typeface="Times New Roman" panose="02020603050405020304" pitchFamily="18" charset="0"/>
-                <a:ea typeface="Times New Roman" panose="02020603050405020304" pitchFamily="18" charset="0"/>
-              </a:rPr>
-              <a:t>Other potential data sources:</a:t>
-            </a:r>
-            <a:endParaRPr lang="en-US" sz="2400" dirty="0">
-              <a:solidFill>
-                <a:srgbClr val="000000"/>
-              </a:solidFill>
-              <a:effectLst/>
-              <a:latin typeface="Times New Roman" panose="02020603050405020304" pitchFamily="18" charset="0"/>
-              <a:ea typeface="Times New Roman" panose="02020603050405020304" pitchFamily="18" charset="0"/>
-            </a:endParaRPr>
-          </a:p>
-          <a:p>
-            <a:pPr lvl="1"/>
-            <a:r>
-              <a:rPr lang="en-US" sz="2000" dirty="0"/>
-              <a:t>U.S. Department of Housing and Urban Development</a:t>
-            </a:r>
-          </a:p>
-          <a:p>
-            <a:pPr lvl="2"/>
-            <a:r>
-              <a:rPr lang="en-US" sz="1800" dirty="0">
-                <a:hlinkClick r:id="rId3"/>
-              </a:rPr>
-              <a:t>https://www.hud.gov/</a:t>
-            </a:r>
-            <a:endParaRPr lang="en-US" sz="1800" dirty="0"/>
-          </a:p>
-          <a:p>
-            <a:pPr lvl="1"/>
-            <a:r>
-              <a:rPr lang="en-US" sz="2000" dirty="0"/>
-              <a:t>US Census Bureau</a:t>
-            </a:r>
-          </a:p>
-          <a:p>
-            <a:pPr lvl="2"/>
-            <a:r>
-              <a:rPr lang="en-US" sz="1800" dirty="0"/>
-              <a:t>New Residential Sales: </a:t>
-            </a:r>
-            <a:r>
-              <a:rPr lang="en-US" sz="1800" dirty="0">
-                <a:hlinkClick r:id="rId4"/>
-              </a:rPr>
-              <a:t>https://www.census.gov/construction/nrs/index.html</a:t>
-            </a:r>
-            <a:endParaRPr lang="en-US" sz="1800" dirty="0"/>
-          </a:p>
-          <a:p>
-            <a:pPr lvl="1"/>
-            <a:endParaRPr lang="en-US" dirty="0"/>
+              <a:t>Pseudocode, cont.</a:t>
+            </a:r>
           </a:p>
         </p:txBody>
       </p:sp>
@@ -5083,15 +4953,99 @@
                   </a:schemeClr>
                 </a:solidFill>
               </a:rPr>
-              <a:t>The Data Science Process (1/5)</a:t>
-            </a:r>
-          </a:p>
-        </p:txBody>
-      </p:sp>
+              <a:t>Program Design</a:t>
+            </a:r>
+          </a:p>
+        </p:txBody>
+      </p:sp>
+      <p:sp>
+        <p:nvSpPr>
+          <p:cNvPr id="8" name="Content Placeholder 7">
+            <a:extLst>
+              <a:ext uri="{FF2B5EF4-FFF2-40B4-BE49-F238E27FC236}">
+                <a16:creationId xmlns:a16="http://schemas.microsoft.com/office/drawing/2014/main" id="{B81FC63E-1C1A-2B87-6EA1-726A19EFC7A9}"/>
+              </a:ext>
+            </a:extLst>
+          </p:cNvPr>
+          <p:cNvSpPr>
+            <a:spLocks noGrp="1"/>
+          </p:cNvSpPr>
+          <p:nvPr>
+            <p:ph idx="1"/>
+          </p:nvPr>
+        </p:nvSpPr>
+        <p:spPr/>
+        <p:txBody>
+          <a:bodyPr/>
+          <a:lstStyle/>
+          <a:p>
+            <a:endParaRPr lang="en-US"/>
+          </a:p>
+        </p:txBody>
+      </p:sp>
+      <p:pic>
+        <p:nvPicPr>
+          <p:cNvPr id="9" name="Picture 8">
+            <a:extLst>
+              <a:ext uri="{FF2B5EF4-FFF2-40B4-BE49-F238E27FC236}">
+                <a16:creationId xmlns:a16="http://schemas.microsoft.com/office/drawing/2014/main" id="{2DEED15B-C586-66F8-EA0F-B51BE14300D8}"/>
+              </a:ext>
+            </a:extLst>
+          </p:cNvPr>
+          <p:cNvPicPr>
+            <a:picLocks noChangeAspect="1"/>
+          </p:cNvPicPr>
+          <p:nvPr/>
+        </p:nvPicPr>
+        <p:blipFill rotWithShape="1">
+          <a:blip r:embed="rId2"/>
+          <a:srcRect l="65756" b="95135"/>
+          <a:stretch/>
+        </p:blipFill>
+        <p:spPr>
+          <a:xfrm>
+            <a:off x="5399315" y="1132144"/>
+            <a:ext cx="1766510" cy="275741"/>
+          </a:xfrm>
+          <a:prstGeom prst="rect">
+            <a:avLst/>
+          </a:prstGeom>
+        </p:spPr>
+      </p:pic>
+      <p:pic>
+        <p:nvPicPr>
+          <p:cNvPr id="7" name="Picture 6">
+            <a:extLst>
+              <a:ext uri="{FF2B5EF4-FFF2-40B4-BE49-F238E27FC236}">
+                <a16:creationId xmlns:a16="http://schemas.microsoft.com/office/drawing/2014/main" id="{6D6A1516-988E-C958-FEA1-F270BAADC913}"/>
+              </a:ext>
+            </a:extLst>
+          </p:cNvPr>
+          <p:cNvPicPr>
+            <a:picLocks noChangeAspect="1"/>
+          </p:cNvPicPr>
+          <p:nvPr/>
+        </p:nvPicPr>
+        <p:blipFill>
+          <a:blip r:embed="rId3"/>
+          <a:stretch>
+            <a:fillRect/>
+          </a:stretch>
+        </p:blipFill>
+        <p:spPr>
+          <a:xfrm>
+            <a:off x="2528600" y="1634088"/>
+            <a:ext cx="7507940" cy="4542875"/>
+          </a:xfrm>
+          <a:prstGeom prst="rect">
+            <a:avLst/>
+          </a:prstGeom>
+        </p:spPr>
+      </p:pic>
     </p:spTree>
     <p:extLst>
       <p:ext uri="{BB962C8B-B14F-4D97-AF65-F5344CB8AC3E}">
-        <p14:creationId xmlns:p14="http://schemas.microsoft.com/office/powerpoint/2010/main" val="427023157"/>
+        <p14:creationId xmlns:p14="http://schemas.microsoft.com/office/powerpoint/2010/main" val="3121724213"/>
       </p:ext>
     </p:extLst>
   </p:cSld>
@@ -5141,6 +5095,300 @@
           <a:p>
             <a:r>
               <a:rPr lang="en-US" dirty="0"/>
+              <a:t>Acquire</a:t>
+            </a:r>
+          </a:p>
+        </p:txBody>
+      </p:sp>
+      <p:sp>
+        <p:nvSpPr>
+          <p:cNvPr id="3" name="Content Placeholder 2">
+            <a:extLst>
+              <a:ext uri="{FF2B5EF4-FFF2-40B4-BE49-F238E27FC236}">
+                <a16:creationId xmlns:a16="http://schemas.microsoft.com/office/drawing/2014/main" id="{7FEAE391-6366-4E20-A14E-0ECFAEA8029A}"/>
+              </a:ext>
+            </a:extLst>
+          </p:cNvPr>
+          <p:cNvSpPr>
+            <a:spLocks noGrp="1"/>
+          </p:cNvSpPr>
+          <p:nvPr>
+            <p:ph idx="1"/>
+          </p:nvPr>
+        </p:nvSpPr>
+        <p:spPr/>
+        <p:txBody>
+          <a:bodyPr/>
+          <a:lstStyle/>
+          <a:p>
+            <a:r>
+              <a:rPr lang="en-US" sz="2400" dirty="0">
+                <a:solidFill>
+                  <a:srgbClr val="000000"/>
+                </a:solidFill>
+                <a:effectLst/>
+                <a:latin typeface="Times New Roman" panose="02020603050405020304" pitchFamily="18" charset="0"/>
+                <a:ea typeface="Times New Roman" panose="02020603050405020304" pitchFamily="18" charset="0"/>
+              </a:rPr>
+              <a:t>Housing sales data was ac</a:t>
+            </a:r>
+            <a:r>
+              <a:rPr lang="en-US" sz="2400" dirty="0">
+                <a:solidFill>
+                  <a:srgbClr val="000000"/>
+                </a:solidFill>
+                <a:latin typeface="Times New Roman" panose="02020603050405020304" pitchFamily="18" charset="0"/>
+                <a:ea typeface="Times New Roman" panose="02020603050405020304" pitchFamily="18" charset="0"/>
+              </a:rPr>
+              <a:t>quired through Kaggle.com, which is a popular place for data scientists, machine learning practitioners, engineers, and data scientists to post projects, participate in data science competitions and acquire open-source datasets.</a:t>
+            </a:r>
+          </a:p>
+          <a:p>
+            <a:pPr lvl="1"/>
+            <a:r>
+              <a:rPr lang="en-US" sz="2000" dirty="0">
+                <a:solidFill>
+                  <a:srgbClr val="000000"/>
+                </a:solidFill>
+                <a:latin typeface="Times New Roman" panose="02020603050405020304" pitchFamily="18" charset="0"/>
+                <a:ea typeface="Times New Roman" panose="02020603050405020304" pitchFamily="18" charset="0"/>
+              </a:rPr>
+              <a:t>Data source: </a:t>
+            </a:r>
+            <a:r>
+              <a:rPr lang="en-US" sz="2000" dirty="0">
+                <a:solidFill>
+                  <a:srgbClr val="000000"/>
+                </a:solidFill>
+                <a:latin typeface="Times New Roman" panose="02020603050405020304" pitchFamily="18" charset="0"/>
+                <a:ea typeface="Times New Roman" panose="02020603050405020304" pitchFamily="18" charset="0"/>
+                <a:hlinkClick r:id="rId2"/>
+              </a:rPr>
+              <a:t>https://www.kaggle.com/datasets/vallabhadattap/kingcountyhousing?select=KC_housing_data.csv</a:t>
+            </a:r>
+            <a:endParaRPr lang="en-US" sz="2000" dirty="0">
+              <a:solidFill>
+                <a:srgbClr val="000000"/>
+              </a:solidFill>
+              <a:latin typeface="Times New Roman" panose="02020603050405020304" pitchFamily="18" charset="0"/>
+              <a:ea typeface="Times New Roman" panose="02020603050405020304" pitchFamily="18" charset="0"/>
+            </a:endParaRPr>
+          </a:p>
+          <a:p>
+            <a:r>
+              <a:rPr lang="en-US" sz="2400" dirty="0">
+                <a:solidFill>
+                  <a:srgbClr val="000000"/>
+                </a:solidFill>
+                <a:latin typeface="Times New Roman" panose="02020603050405020304" pitchFamily="18" charset="0"/>
+                <a:ea typeface="Times New Roman" panose="02020603050405020304" pitchFamily="18" charset="0"/>
+              </a:rPr>
+              <a:t>Other potential data sources:</a:t>
+            </a:r>
+            <a:endParaRPr lang="en-US" sz="2400" dirty="0">
+              <a:solidFill>
+                <a:srgbClr val="000000"/>
+              </a:solidFill>
+              <a:effectLst/>
+              <a:latin typeface="Times New Roman" panose="02020603050405020304" pitchFamily="18" charset="0"/>
+              <a:ea typeface="Times New Roman" panose="02020603050405020304" pitchFamily="18" charset="0"/>
+            </a:endParaRPr>
+          </a:p>
+          <a:p>
+            <a:pPr lvl="1"/>
+            <a:r>
+              <a:rPr lang="en-US" sz="2000" dirty="0"/>
+              <a:t>U.S. Department of Housing and Urban Development</a:t>
+            </a:r>
+          </a:p>
+          <a:p>
+            <a:pPr lvl="2"/>
+            <a:r>
+              <a:rPr lang="en-US" sz="1800" dirty="0">
+                <a:hlinkClick r:id="rId3"/>
+              </a:rPr>
+              <a:t>https://www.hud.gov/</a:t>
+            </a:r>
+            <a:endParaRPr lang="en-US" sz="1800" dirty="0"/>
+          </a:p>
+          <a:p>
+            <a:pPr lvl="1"/>
+            <a:r>
+              <a:rPr lang="en-US" sz="2000" dirty="0"/>
+              <a:t>US Census Bureau</a:t>
+            </a:r>
+          </a:p>
+          <a:p>
+            <a:pPr lvl="2"/>
+            <a:r>
+              <a:rPr lang="en-US" sz="1800" dirty="0"/>
+              <a:t>New Residential Sales: </a:t>
+            </a:r>
+            <a:r>
+              <a:rPr lang="en-US" sz="1800" dirty="0">
+                <a:hlinkClick r:id="rId4"/>
+              </a:rPr>
+              <a:t>https://www.census.gov/construction/nrs/index.html</a:t>
+            </a:r>
+            <a:endParaRPr lang="en-US" sz="1800" dirty="0"/>
+          </a:p>
+          <a:p>
+            <a:pPr lvl="1"/>
+            <a:endParaRPr lang="en-US" dirty="0"/>
+          </a:p>
+        </p:txBody>
+      </p:sp>
+      <p:sp>
+        <p:nvSpPr>
+          <p:cNvPr id="5" name="Footer Placeholder 4">
+            <a:extLst>
+              <a:ext uri="{FF2B5EF4-FFF2-40B4-BE49-F238E27FC236}">
+                <a16:creationId xmlns:a16="http://schemas.microsoft.com/office/drawing/2014/main" id="{E05174E8-A6F1-B722-21E7-1FEB9E988BD2}"/>
+              </a:ext>
+            </a:extLst>
+          </p:cNvPr>
+          <p:cNvSpPr>
+            <a:spLocks noGrp="1"/>
+          </p:cNvSpPr>
+          <p:nvPr>
+            <p:ph type="ftr" sz="quarter" idx="11"/>
+          </p:nvPr>
+        </p:nvSpPr>
+        <p:spPr/>
+        <p:txBody>
+          <a:bodyPr/>
+          <a:lstStyle/>
+          <a:p>
+            <a:r>
+              <a:rPr lang="en-US"/>
+              <a:t>E Rodriguez</a:t>
+            </a:r>
+          </a:p>
+        </p:txBody>
+      </p:sp>
+      <p:sp>
+        <p:nvSpPr>
+          <p:cNvPr id="6" name="Slide Number Placeholder 5">
+            <a:extLst>
+              <a:ext uri="{FF2B5EF4-FFF2-40B4-BE49-F238E27FC236}">
+                <a16:creationId xmlns:a16="http://schemas.microsoft.com/office/drawing/2014/main" id="{ADE23920-66B9-14C6-BB52-1D96B8559CCF}"/>
+              </a:ext>
+            </a:extLst>
+          </p:cNvPr>
+          <p:cNvSpPr>
+            <a:spLocks noGrp="1"/>
+          </p:cNvSpPr>
+          <p:nvPr>
+            <p:ph type="sldNum" sz="quarter" idx="12"/>
+          </p:nvPr>
+        </p:nvSpPr>
+        <p:spPr/>
+        <p:txBody>
+          <a:bodyPr/>
+          <a:lstStyle/>
+          <a:p>
+            <a:fld id="{7BC5D697-CC64-4CAF-A466-D1105DD36B62}" type="slidenum">
+              <a:rPr lang="en-US" smtClean="0"/>
+              <a:t>11</a:t>
+            </a:fld>
+            <a:endParaRPr lang="en-US"/>
+          </a:p>
+        </p:txBody>
+      </p:sp>
+      <p:sp>
+        <p:nvSpPr>
+          <p:cNvPr id="4" name="TextBox 3">
+            <a:extLst>
+              <a:ext uri="{FF2B5EF4-FFF2-40B4-BE49-F238E27FC236}">
+                <a16:creationId xmlns:a16="http://schemas.microsoft.com/office/drawing/2014/main" id="{48B42655-B426-E42E-6080-01EA0B1F1436}"/>
+              </a:ext>
+            </a:extLst>
+          </p:cNvPr>
+          <p:cNvSpPr txBox="1"/>
+          <p:nvPr/>
+        </p:nvSpPr>
+        <p:spPr>
+          <a:xfrm>
+            <a:off x="9035144" y="217714"/>
+            <a:ext cx="2743200" cy="338554"/>
+          </a:xfrm>
+          <a:prstGeom prst="rect">
+            <a:avLst/>
+          </a:prstGeom>
+          <a:noFill/>
+        </p:spPr>
+        <p:txBody>
+          <a:bodyPr wrap="square" rtlCol="0">
+            <a:spAutoFit/>
+          </a:bodyPr>
+          <a:lstStyle/>
+          <a:p>
+            <a:r>
+              <a:rPr lang="en-US" sz="1600" dirty="0">
+                <a:solidFill>
+                  <a:schemeClr val="bg1">
+                    <a:lumMod val="50000"/>
+                  </a:schemeClr>
+                </a:solidFill>
+              </a:rPr>
+              <a:t>The Data Science Process (1/5)</a:t>
+            </a:r>
+          </a:p>
+        </p:txBody>
+      </p:sp>
+    </p:spTree>
+    <p:extLst>
+      <p:ext uri="{BB962C8B-B14F-4D97-AF65-F5344CB8AC3E}">
+        <p14:creationId xmlns:p14="http://schemas.microsoft.com/office/powerpoint/2010/main" val="427023157"/>
+      </p:ext>
+    </p:extLst>
+  </p:cSld>
+  <p:clrMapOvr>
+    <a:masterClrMapping/>
+  </p:clrMapOvr>
+</p:sld>
+</file>
+
+<file path=ppt/slides/slide12.xml><?xml version="1.0" encoding="utf-8"?>
+<p:sld xmlns:a="http://schemas.openxmlformats.org/drawingml/2006/main" xmlns:r="http://schemas.openxmlformats.org/officeDocument/2006/relationships" xmlns:p="http://schemas.openxmlformats.org/presentationml/2006/main">
+  <p:cSld>
+    <p:spTree>
+      <p:nvGrpSpPr>
+        <p:cNvPr id="1" name=""/>
+        <p:cNvGrpSpPr/>
+        <p:nvPr/>
+      </p:nvGrpSpPr>
+      <p:grpSpPr>
+        <a:xfrm>
+          <a:off x="0" y="0"/>
+          <a:ext cx="0" cy="0"/>
+          <a:chOff x="0" y="0"/>
+          <a:chExt cx="0" cy="0"/>
+        </a:xfrm>
+      </p:grpSpPr>
+      <p:sp>
+        <p:nvSpPr>
+          <p:cNvPr id="2" name="Title 1">
+            <a:extLst>
+              <a:ext uri="{FF2B5EF4-FFF2-40B4-BE49-F238E27FC236}">
+                <a16:creationId xmlns:a16="http://schemas.microsoft.com/office/drawing/2014/main" id="{DB2A7252-6823-44F9-B464-D7A15D12BB65}"/>
+              </a:ext>
+            </a:extLst>
+          </p:cNvPr>
+          <p:cNvSpPr>
+            <a:spLocks noGrp="1"/>
+          </p:cNvSpPr>
+          <p:nvPr>
+            <p:ph type="title"/>
+          </p:nvPr>
+        </p:nvSpPr>
+        <p:spPr/>
+        <p:txBody>
+          <a:bodyPr/>
+          <a:lstStyle/>
+          <a:p>
+            <a:r>
+              <a:rPr lang="en-US" dirty="0"/>
               <a:t>Prepare</a:t>
             </a:r>
           </a:p>
@@ -5259,7 +5507,7 @@
           <a:p>
             <a:fld id="{7BC5D697-CC64-4CAF-A466-D1105DD36B62}" type="slidenum">
               <a:rPr lang="en-US" smtClean="0"/>
-              <a:t>11</a:t>
+              <a:t>12</a:t>
             </a:fld>
             <a:endParaRPr lang="en-US"/>
           </a:p>
@@ -5349,7 +5597,7 @@
 </p:sld>
 </file>
 
-<file path=ppt/slides/slide12.xml><?xml version="1.0" encoding="utf-8"?>
+<file path=ppt/slides/slide13.xml><?xml version="1.0" encoding="utf-8"?>
 <p:sld xmlns:a="http://schemas.openxmlformats.org/drawingml/2006/main" xmlns:r="http://schemas.openxmlformats.org/officeDocument/2006/relationships" xmlns:p="http://schemas.openxmlformats.org/presentationml/2006/main">
   <p:cSld>
     <p:spTree>
@@ -5505,7 +5753,7 @@
           <a:p>
             <a:fld id="{7BC5D697-CC64-4CAF-A466-D1105DD36B62}" type="slidenum">
               <a:rPr lang="en-US" smtClean="0"/>
-              <a:t>12</a:t>
+              <a:t>13</a:t>
             </a:fld>
             <a:endParaRPr lang="en-US"/>
           </a:p>
@@ -5625,7 +5873,7 @@
 </p:sld>
 </file>
 
-<file path=ppt/slides/slide13.xml><?xml version="1.0" encoding="utf-8"?>
+<file path=ppt/slides/slide14.xml><?xml version="1.0" encoding="utf-8"?>
 <p:sld xmlns:a="http://schemas.openxmlformats.org/drawingml/2006/main" xmlns:r="http://schemas.openxmlformats.org/officeDocument/2006/relationships" xmlns:p="http://schemas.openxmlformats.org/presentationml/2006/main">
   <p:cSld>
     <p:spTree>
@@ -5763,7 +6011,7 @@
           <a:p>
             <a:fld id="{7BC5D697-CC64-4CAF-A466-D1105DD36B62}" type="slidenum">
               <a:rPr lang="en-US" smtClean="0"/>
-              <a:t>13</a:t>
+              <a:t>14</a:t>
             </a:fld>
             <a:endParaRPr lang="en-US"/>
           </a:p>
@@ -5883,7 +6131,7 @@
 </p:sld>
 </file>
 
-<file path=ppt/slides/slide14.xml><?xml version="1.0" encoding="utf-8"?>
+<file path=ppt/slides/slide15.xml><?xml version="1.0" encoding="utf-8"?>
 <p:sld xmlns:a="http://schemas.openxmlformats.org/drawingml/2006/main" xmlns:r="http://schemas.openxmlformats.org/officeDocument/2006/relationships" xmlns:p="http://schemas.openxmlformats.org/presentationml/2006/main">
   <p:cSld>
     <p:spTree>
@@ -6021,7 +6269,7 @@
           <a:p>
             <a:fld id="{7BC5D697-CC64-4CAF-A466-D1105DD36B62}" type="slidenum">
               <a:rPr lang="en-US" smtClean="0"/>
-              <a:t>14</a:t>
+              <a:t>15</a:t>
             </a:fld>
             <a:endParaRPr lang="en-US"/>
           </a:p>
@@ -6141,220 +6389,6 @@
 </p:sld>
 </file>
 
-<file path=ppt/slides/slide15.xml><?xml version="1.0" encoding="utf-8"?>
-<p:sld xmlns:a="http://schemas.openxmlformats.org/drawingml/2006/main" xmlns:r="http://schemas.openxmlformats.org/officeDocument/2006/relationships" xmlns:p="http://schemas.openxmlformats.org/presentationml/2006/main">
-  <p:cSld>
-    <p:spTree>
-      <p:nvGrpSpPr>
-        <p:cNvPr id="1" name=""/>
-        <p:cNvGrpSpPr/>
-        <p:nvPr/>
-      </p:nvGrpSpPr>
-      <p:grpSpPr>
-        <a:xfrm>
-          <a:off x="0" y="0"/>
-          <a:ext cx="0" cy="0"/>
-          <a:chOff x="0" y="0"/>
-          <a:chExt cx="0" cy="0"/>
-        </a:xfrm>
-      </p:grpSpPr>
-      <p:sp>
-        <p:nvSpPr>
-          <p:cNvPr id="2" name="Title 1">
-            <a:extLst>
-              <a:ext uri="{FF2B5EF4-FFF2-40B4-BE49-F238E27FC236}">
-                <a16:creationId xmlns:a16="http://schemas.microsoft.com/office/drawing/2014/main" id="{DB2A7252-6823-44F9-B464-D7A15D12BB65}"/>
-              </a:ext>
-            </a:extLst>
-          </p:cNvPr>
-          <p:cNvSpPr>
-            <a:spLocks noGrp="1"/>
-          </p:cNvSpPr>
-          <p:nvPr>
-            <p:ph type="title"/>
-          </p:nvPr>
-        </p:nvSpPr>
-        <p:spPr/>
-        <p:txBody>
-          <a:bodyPr/>
-          <a:lstStyle/>
-          <a:p>
-            <a:r>
-              <a:rPr lang="en-US" dirty="0"/>
-              <a:t>Analyze data</a:t>
-            </a:r>
-          </a:p>
-        </p:txBody>
-      </p:sp>
-      <p:sp>
-        <p:nvSpPr>
-          <p:cNvPr id="3" name="Content Placeholder 2">
-            <a:extLst>
-              <a:ext uri="{FF2B5EF4-FFF2-40B4-BE49-F238E27FC236}">
-                <a16:creationId xmlns:a16="http://schemas.microsoft.com/office/drawing/2014/main" id="{7FEAE391-6366-4E20-A14E-0ECFAEA8029A}"/>
-              </a:ext>
-            </a:extLst>
-          </p:cNvPr>
-          <p:cNvSpPr>
-            <a:spLocks noGrp="1"/>
-          </p:cNvSpPr>
-          <p:nvPr>
-            <p:ph idx="1"/>
-          </p:nvPr>
-        </p:nvSpPr>
-        <p:spPr/>
-        <p:txBody>
-          <a:bodyPr/>
-          <a:lstStyle/>
-          <a:p>
-            <a:r>
-              <a:rPr lang="en-US" sz="1800" dirty="0">
-                <a:solidFill>
-                  <a:srgbClr val="000000"/>
-                </a:solidFill>
-                <a:effectLst/>
-                <a:latin typeface="Times New Roman" panose="02020603050405020304" pitchFamily="18" charset="0"/>
-                <a:ea typeface="Times New Roman" panose="02020603050405020304" pitchFamily="18" charset="0"/>
-              </a:rPr>
-              <a:t>&lt;select analytical technique, build models&gt;</a:t>
-            </a:r>
-          </a:p>
-          <a:p>
-            <a:r>
-              <a:rPr lang="en-US" sz="1800" dirty="0">
-                <a:solidFill>
-                  <a:srgbClr val="000000"/>
-                </a:solidFill>
-                <a:latin typeface="Times New Roman" panose="02020603050405020304" pitchFamily="18" charset="0"/>
-                <a:ea typeface="Times New Roman" panose="02020603050405020304" pitchFamily="18" charset="0"/>
-              </a:rPr>
-              <a:t>This is a regression task, and it is of supervised type of ML (i.e., the training data being fed into the model is labeled).</a:t>
-            </a:r>
-            <a:endParaRPr lang="en-US" sz="1800" dirty="0">
-              <a:solidFill>
-                <a:srgbClr val="000000"/>
-              </a:solidFill>
-              <a:effectLst/>
-              <a:latin typeface="Times New Roman" panose="02020603050405020304" pitchFamily="18" charset="0"/>
-              <a:ea typeface="Times New Roman" panose="02020603050405020304" pitchFamily="18" charset="0"/>
-            </a:endParaRPr>
-          </a:p>
-          <a:p>
-            <a:endParaRPr lang="en-US" dirty="0"/>
-          </a:p>
-        </p:txBody>
-      </p:sp>
-      <p:sp>
-        <p:nvSpPr>
-          <p:cNvPr id="4" name="Footer Placeholder 3">
-            <a:extLst>
-              <a:ext uri="{FF2B5EF4-FFF2-40B4-BE49-F238E27FC236}">
-                <a16:creationId xmlns:a16="http://schemas.microsoft.com/office/drawing/2014/main" id="{F420658D-0BB6-CC2C-261F-3A6BEB15974D}"/>
-              </a:ext>
-            </a:extLst>
-          </p:cNvPr>
-          <p:cNvSpPr>
-            <a:spLocks noGrp="1"/>
-          </p:cNvSpPr>
-          <p:nvPr>
-            <p:ph type="ftr" sz="quarter" idx="11"/>
-          </p:nvPr>
-        </p:nvSpPr>
-        <p:spPr/>
-        <p:txBody>
-          <a:bodyPr/>
-          <a:lstStyle/>
-          <a:p>
-            <a:r>
-              <a:rPr lang="en-US"/>
-              <a:t>E Rodriguez</a:t>
-            </a:r>
-          </a:p>
-        </p:txBody>
-      </p:sp>
-      <p:sp>
-        <p:nvSpPr>
-          <p:cNvPr id="5" name="Slide Number Placeholder 4">
-            <a:extLst>
-              <a:ext uri="{FF2B5EF4-FFF2-40B4-BE49-F238E27FC236}">
-                <a16:creationId xmlns:a16="http://schemas.microsoft.com/office/drawing/2014/main" id="{DDDE90EF-1FBF-CA62-C970-312B3CB0ACA7}"/>
-              </a:ext>
-            </a:extLst>
-          </p:cNvPr>
-          <p:cNvSpPr>
-            <a:spLocks noGrp="1"/>
-          </p:cNvSpPr>
-          <p:nvPr>
-            <p:ph type="sldNum" sz="quarter" idx="12"/>
-          </p:nvPr>
-        </p:nvSpPr>
-        <p:spPr/>
-        <p:txBody>
-          <a:bodyPr/>
-          <a:lstStyle/>
-          <a:p>
-            <a:fld id="{7BC5D697-CC64-4CAF-A466-D1105DD36B62}" type="slidenum">
-              <a:rPr lang="en-US" smtClean="0"/>
-              <a:t>15</a:t>
-            </a:fld>
-            <a:endParaRPr lang="en-US"/>
-          </a:p>
-        </p:txBody>
-      </p:sp>
-      <p:sp>
-        <p:nvSpPr>
-          <p:cNvPr id="7" name="TextBox 6">
-            <a:extLst>
-              <a:ext uri="{FF2B5EF4-FFF2-40B4-BE49-F238E27FC236}">
-                <a16:creationId xmlns:a16="http://schemas.microsoft.com/office/drawing/2014/main" id="{C21ED8FC-49BB-1C41-244E-80C3AF8A9B36}"/>
-              </a:ext>
-            </a:extLst>
-          </p:cNvPr>
-          <p:cNvSpPr txBox="1"/>
-          <p:nvPr/>
-        </p:nvSpPr>
-        <p:spPr>
-          <a:xfrm>
-            <a:off x="9035144" y="217714"/>
-            <a:ext cx="2743200" cy="338554"/>
-          </a:xfrm>
-          <a:prstGeom prst="rect">
-            <a:avLst/>
-          </a:prstGeom>
-          <a:noFill/>
-        </p:spPr>
-        <p:txBody>
-          <a:bodyPr wrap="square" rtlCol="0">
-            <a:spAutoFit/>
-          </a:bodyPr>
-          <a:lstStyle/>
-          <a:p>
-            <a:r>
-              <a:rPr lang="en-US" sz="1600" dirty="0">
-                <a:solidFill>
-                  <a:schemeClr val="bg1">
-                    <a:lumMod val="50000"/>
-                  </a:schemeClr>
-                </a:solidFill>
-              </a:rPr>
-              <a:t>The Data Science Process (3/5)</a:t>
-            </a:r>
-          </a:p>
-        </p:txBody>
-      </p:sp>
-    </p:spTree>
-    <p:extLst>
-      <p:ext uri="{BB962C8B-B14F-4D97-AF65-F5344CB8AC3E}">
-        <p14:creationId xmlns:p14="http://schemas.microsoft.com/office/powerpoint/2010/main" val="69798042"/>
-      </p:ext>
-    </p:extLst>
-  </p:cSld>
-  <p:clrMapOvr>
-    <a:masterClrMapping/>
-  </p:clrMapOvr>
-</p:sld>
-</file>
-
 <file path=ppt/slides/slide16.xml><?xml version="1.0" encoding="utf-8"?>
 <p:sld xmlns:a="http://schemas.openxmlformats.org/drawingml/2006/main" xmlns:r="http://schemas.openxmlformats.org/officeDocument/2006/relationships" xmlns:p="http://schemas.openxmlformats.org/presentationml/2006/main">
   <p:cSld>
@@ -6395,7 +6429,7 @@
           <a:p>
             <a:r>
               <a:rPr lang="en-US" dirty="0"/>
-              <a:t>Report</a:t>
+              <a:t>Analyze data</a:t>
             </a:r>
           </a:p>
         </p:txBody>
@@ -6430,8 +6464,28 @@
                 <a:latin typeface="Times New Roman" panose="02020603050405020304" pitchFamily="18" charset="0"/>
                 <a:ea typeface="Times New Roman" panose="02020603050405020304" pitchFamily="18" charset="0"/>
               </a:rPr>
-              <a:t>&lt;communicate results&gt;</a:t>
-            </a:r>
+              <a:t>&lt;select analytical technique, build models&gt;</a:t>
+            </a:r>
+          </a:p>
+          <a:p>
+            <a:r>
+              <a:rPr lang="en-US" sz="1800" dirty="0">
+                <a:solidFill>
+                  <a:srgbClr val="000000"/>
+                </a:solidFill>
+                <a:latin typeface="Times New Roman" panose="02020603050405020304" pitchFamily="18" charset="0"/>
+                <a:ea typeface="Times New Roman" panose="02020603050405020304" pitchFamily="18" charset="0"/>
+              </a:rPr>
+              <a:t>This is a regression task, and it is of supervised type of ML (i.e., the training data being fed into the model is labeled).</a:t>
+            </a:r>
+            <a:endParaRPr lang="en-US" sz="1800" dirty="0">
+              <a:solidFill>
+                <a:srgbClr val="000000"/>
+              </a:solidFill>
+              <a:effectLst/>
+              <a:latin typeface="Times New Roman" panose="02020603050405020304" pitchFamily="18" charset="0"/>
+              <a:ea typeface="Times New Roman" panose="02020603050405020304" pitchFamily="18" charset="0"/>
+            </a:endParaRPr>
           </a:p>
           <a:p>
             <a:endParaRPr lang="en-US" dirty="0"/>
@@ -6443,7 +6497,7 @@
           <p:cNvPr id="4" name="Footer Placeholder 3">
             <a:extLst>
               <a:ext uri="{FF2B5EF4-FFF2-40B4-BE49-F238E27FC236}">
-                <a16:creationId xmlns:a16="http://schemas.microsoft.com/office/drawing/2014/main" id="{8CD959E9-FAD1-1395-1BB6-B6BBBDCEF94A}"/>
+                <a16:creationId xmlns:a16="http://schemas.microsoft.com/office/drawing/2014/main" id="{F420658D-0BB6-CC2C-261F-3A6BEB15974D}"/>
               </a:ext>
             </a:extLst>
           </p:cNvPr>
@@ -6471,7 +6525,7 @@
           <p:cNvPr id="5" name="Slide Number Placeholder 4">
             <a:extLst>
               <a:ext uri="{FF2B5EF4-FFF2-40B4-BE49-F238E27FC236}">
-                <a16:creationId xmlns:a16="http://schemas.microsoft.com/office/drawing/2014/main" id="{FB5EED95-FAA9-78BB-A791-5A2F979B4633}"/>
+                <a16:creationId xmlns:a16="http://schemas.microsoft.com/office/drawing/2014/main" id="{DDDE90EF-1FBF-CA62-C970-312B3CB0ACA7}"/>
               </a:ext>
             </a:extLst>
           </p:cNvPr>
@@ -6500,7 +6554,7 @@
           <p:cNvPr id="7" name="TextBox 6">
             <a:extLst>
               <a:ext uri="{FF2B5EF4-FFF2-40B4-BE49-F238E27FC236}">
-                <a16:creationId xmlns:a16="http://schemas.microsoft.com/office/drawing/2014/main" id="{0AE0792E-F01B-82AE-F9DB-BF69DD5E274A}"/>
+                <a16:creationId xmlns:a16="http://schemas.microsoft.com/office/drawing/2014/main" id="{C21ED8FC-49BB-1C41-244E-80C3AF8A9B36}"/>
               </a:ext>
             </a:extLst>
           </p:cNvPr>
@@ -6531,7 +6585,7 @@
                   </a:schemeClr>
                 </a:solidFill>
               </a:rPr>
-              <a:t>The Data Science Process (4/5)</a:t>
+              <a:t>The Data Science Process (3/5)</a:t>
             </a:r>
           </a:p>
         </p:txBody>
@@ -6539,7 +6593,7 @@
     </p:spTree>
     <p:extLst>
       <p:ext uri="{BB962C8B-B14F-4D97-AF65-F5344CB8AC3E}">
-        <p14:creationId xmlns:p14="http://schemas.microsoft.com/office/powerpoint/2010/main" val="2309908418"/>
+        <p14:creationId xmlns:p14="http://schemas.microsoft.com/office/powerpoint/2010/main" val="69798042"/>
       </p:ext>
     </p:extLst>
   </p:cSld>
@@ -6571,6 +6625,200 @@
           <p:cNvPr id="2" name="Title 1">
             <a:extLst>
               <a:ext uri="{FF2B5EF4-FFF2-40B4-BE49-F238E27FC236}">
+                <a16:creationId xmlns:a16="http://schemas.microsoft.com/office/drawing/2014/main" id="{DB2A7252-6823-44F9-B464-D7A15D12BB65}"/>
+              </a:ext>
+            </a:extLst>
+          </p:cNvPr>
+          <p:cNvSpPr>
+            <a:spLocks noGrp="1"/>
+          </p:cNvSpPr>
+          <p:nvPr>
+            <p:ph type="title"/>
+          </p:nvPr>
+        </p:nvSpPr>
+        <p:spPr/>
+        <p:txBody>
+          <a:bodyPr/>
+          <a:lstStyle/>
+          <a:p>
+            <a:r>
+              <a:rPr lang="en-US" dirty="0"/>
+              <a:t>Report</a:t>
+            </a:r>
+          </a:p>
+        </p:txBody>
+      </p:sp>
+      <p:sp>
+        <p:nvSpPr>
+          <p:cNvPr id="3" name="Content Placeholder 2">
+            <a:extLst>
+              <a:ext uri="{FF2B5EF4-FFF2-40B4-BE49-F238E27FC236}">
+                <a16:creationId xmlns:a16="http://schemas.microsoft.com/office/drawing/2014/main" id="{7FEAE391-6366-4E20-A14E-0ECFAEA8029A}"/>
+              </a:ext>
+            </a:extLst>
+          </p:cNvPr>
+          <p:cNvSpPr>
+            <a:spLocks noGrp="1"/>
+          </p:cNvSpPr>
+          <p:nvPr>
+            <p:ph idx="1"/>
+          </p:nvPr>
+        </p:nvSpPr>
+        <p:spPr/>
+        <p:txBody>
+          <a:bodyPr/>
+          <a:lstStyle/>
+          <a:p>
+            <a:r>
+              <a:rPr lang="en-US" sz="1800" dirty="0">
+                <a:solidFill>
+                  <a:srgbClr val="000000"/>
+                </a:solidFill>
+                <a:effectLst/>
+                <a:latin typeface="Times New Roman" panose="02020603050405020304" pitchFamily="18" charset="0"/>
+                <a:ea typeface="Times New Roman" panose="02020603050405020304" pitchFamily="18" charset="0"/>
+              </a:rPr>
+              <a:t>&lt;communicate results&gt;</a:t>
+            </a:r>
+          </a:p>
+          <a:p>
+            <a:endParaRPr lang="en-US" dirty="0"/>
+          </a:p>
+        </p:txBody>
+      </p:sp>
+      <p:sp>
+        <p:nvSpPr>
+          <p:cNvPr id="4" name="Footer Placeholder 3">
+            <a:extLst>
+              <a:ext uri="{FF2B5EF4-FFF2-40B4-BE49-F238E27FC236}">
+                <a16:creationId xmlns:a16="http://schemas.microsoft.com/office/drawing/2014/main" id="{8CD959E9-FAD1-1395-1BB6-B6BBBDCEF94A}"/>
+              </a:ext>
+            </a:extLst>
+          </p:cNvPr>
+          <p:cNvSpPr>
+            <a:spLocks noGrp="1"/>
+          </p:cNvSpPr>
+          <p:nvPr>
+            <p:ph type="ftr" sz="quarter" idx="11"/>
+          </p:nvPr>
+        </p:nvSpPr>
+        <p:spPr/>
+        <p:txBody>
+          <a:bodyPr/>
+          <a:lstStyle/>
+          <a:p>
+            <a:r>
+              <a:rPr lang="en-US"/>
+              <a:t>E Rodriguez</a:t>
+            </a:r>
+          </a:p>
+        </p:txBody>
+      </p:sp>
+      <p:sp>
+        <p:nvSpPr>
+          <p:cNvPr id="5" name="Slide Number Placeholder 4">
+            <a:extLst>
+              <a:ext uri="{FF2B5EF4-FFF2-40B4-BE49-F238E27FC236}">
+                <a16:creationId xmlns:a16="http://schemas.microsoft.com/office/drawing/2014/main" id="{FB5EED95-FAA9-78BB-A791-5A2F979B4633}"/>
+              </a:ext>
+            </a:extLst>
+          </p:cNvPr>
+          <p:cNvSpPr>
+            <a:spLocks noGrp="1"/>
+          </p:cNvSpPr>
+          <p:nvPr>
+            <p:ph type="sldNum" sz="quarter" idx="12"/>
+          </p:nvPr>
+        </p:nvSpPr>
+        <p:spPr/>
+        <p:txBody>
+          <a:bodyPr/>
+          <a:lstStyle/>
+          <a:p>
+            <a:fld id="{7BC5D697-CC64-4CAF-A466-D1105DD36B62}" type="slidenum">
+              <a:rPr lang="en-US" smtClean="0"/>
+              <a:t>17</a:t>
+            </a:fld>
+            <a:endParaRPr lang="en-US"/>
+          </a:p>
+        </p:txBody>
+      </p:sp>
+      <p:sp>
+        <p:nvSpPr>
+          <p:cNvPr id="7" name="TextBox 6">
+            <a:extLst>
+              <a:ext uri="{FF2B5EF4-FFF2-40B4-BE49-F238E27FC236}">
+                <a16:creationId xmlns:a16="http://schemas.microsoft.com/office/drawing/2014/main" id="{0AE0792E-F01B-82AE-F9DB-BF69DD5E274A}"/>
+              </a:ext>
+            </a:extLst>
+          </p:cNvPr>
+          <p:cNvSpPr txBox="1"/>
+          <p:nvPr/>
+        </p:nvSpPr>
+        <p:spPr>
+          <a:xfrm>
+            <a:off x="9035144" y="217714"/>
+            <a:ext cx="2743200" cy="338554"/>
+          </a:xfrm>
+          <a:prstGeom prst="rect">
+            <a:avLst/>
+          </a:prstGeom>
+          <a:noFill/>
+        </p:spPr>
+        <p:txBody>
+          <a:bodyPr wrap="square" rtlCol="0">
+            <a:spAutoFit/>
+          </a:bodyPr>
+          <a:lstStyle/>
+          <a:p>
+            <a:r>
+              <a:rPr lang="en-US" sz="1600" dirty="0">
+                <a:solidFill>
+                  <a:schemeClr val="bg1">
+                    <a:lumMod val="50000"/>
+                  </a:schemeClr>
+                </a:solidFill>
+              </a:rPr>
+              <a:t>The Data Science Process (4/5)</a:t>
+            </a:r>
+          </a:p>
+        </p:txBody>
+      </p:sp>
+    </p:spTree>
+    <p:extLst>
+      <p:ext uri="{BB962C8B-B14F-4D97-AF65-F5344CB8AC3E}">
+        <p14:creationId xmlns:p14="http://schemas.microsoft.com/office/powerpoint/2010/main" val="2309908418"/>
+      </p:ext>
+    </p:extLst>
+  </p:cSld>
+  <p:clrMapOvr>
+    <a:masterClrMapping/>
+  </p:clrMapOvr>
+</p:sld>
+</file>
+
+<file path=ppt/slides/slide18.xml><?xml version="1.0" encoding="utf-8"?>
+<p:sld xmlns:a="http://schemas.openxmlformats.org/drawingml/2006/main" xmlns:r="http://schemas.openxmlformats.org/officeDocument/2006/relationships" xmlns:p="http://schemas.openxmlformats.org/presentationml/2006/main">
+  <p:cSld>
+    <p:spTree>
+      <p:nvGrpSpPr>
+        <p:cNvPr id="1" name=""/>
+        <p:cNvGrpSpPr/>
+        <p:nvPr/>
+      </p:nvGrpSpPr>
+      <p:grpSpPr>
+        <a:xfrm>
+          <a:off x="0" y="0"/>
+          <a:ext cx="0" cy="0"/>
+          <a:chOff x="0" y="0"/>
+          <a:chExt cx="0" cy="0"/>
+        </a:xfrm>
+      </p:grpSpPr>
+      <p:sp>
+        <p:nvSpPr>
+          <p:cNvPr id="2" name="Title 1">
+            <a:extLst>
+              <a:ext uri="{FF2B5EF4-FFF2-40B4-BE49-F238E27FC236}">
                 <a16:creationId xmlns:a16="http://schemas.microsoft.com/office/drawing/2014/main" id="{7998C1A2-E365-4EAD-A777-10EF9BD2588C}"/>
               </a:ext>
             </a:extLst>
@@ -6681,7 +6929,7 @@
           <a:p>
             <a:fld id="{7BC5D697-CC64-4CAF-A466-D1105DD36B62}" type="slidenum">
               <a:rPr lang="en-US" smtClean="0"/>
-              <a:t>17</a:t>
+              <a:t>18</a:t>
             </a:fld>
             <a:endParaRPr lang="en-US"/>
           </a:p>
@@ -7140,8 +7388,8 @@
           </a:p>
         </p:txBody>
       </p:sp>
-      <mc:AlternateContent xmlns:mc="http://schemas.openxmlformats.org/markup-compatibility/2006">
-        <mc:Choice xmlns:a14="http://schemas.microsoft.com/office/drawing/2010/main" Requires="a14">
+      <mc:AlternateContent xmlns:mc="http://schemas.openxmlformats.org/markup-compatibility/2006" xmlns:a14="http://schemas.microsoft.com/office/drawing/2010/main">
+        <mc:Choice Requires="a14">
           <p:sp>
             <p:nvSpPr>
               <p:cNvPr id="3" name="Content Placeholder 2">
@@ -8013,7 +8261,7 @@
             </p:txBody>
           </p:sp>
         </mc:Choice>
-        <mc:Fallback>
+        <mc:Fallback xmlns="">
           <p:sp>
             <p:nvSpPr>
               <p:cNvPr id="3" name="Content Placeholder 2">
@@ -8204,7 +8452,7 @@
           <a:p>
             <a:r>
               <a:rPr lang="en-US" dirty="0"/>
-              <a:t>Hierarchy Chart</a:t>
+              <a:t>Top-Down Program Design</a:t>
             </a:r>
           </a:p>
         </p:txBody>
@@ -8261,6 +8509,192 @@
             <a:fld id="{7BC5D697-CC64-4CAF-A466-D1105DD36B62}" type="slidenum">
               <a:rPr lang="en-US" smtClean="0"/>
               <a:t>4</a:t>
+            </a:fld>
+            <a:endParaRPr lang="en-US"/>
+          </a:p>
+        </p:txBody>
+      </p:sp>
+      <p:sp>
+        <p:nvSpPr>
+          <p:cNvPr id="4" name="TextBox 3">
+            <a:extLst>
+              <a:ext uri="{FF2B5EF4-FFF2-40B4-BE49-F238E27FC236}">
+                <a16:creationId xmlns:a16="http://schemas.microsoft.com/office/drawing/2014/main" id="{48B42655-B426-E42E-6080-01EA0B1F1436}"/>
+              </a:ext>
+            </a:extLst>
+          </p:cNvPr>
+          <p:cNvSpPr txBox="1"/>
+          <p:nvPr/>
+        </p:nvSpPr>
+        <p:spPr>
+          <a:xfrm>
+            <a:off x="9035144" y="217714"/>
+            <a:ext cx="2743200" cy="338554"/>
+          </a:xfrm>
+          <a:prstGeom prst="rect">
+            <a:avLst/>
+          </a:prstGeom>
+          <a:noFill/>
+        </p:spPr>
+        <p:txBody>
+          <a:bodyPr wrap="square" rtlCol="0">
+            <a:spAutoFit/>
+          </a:bodyPr>
+          <a:lstStyle/>
+          <a:p>
+            <a:r>
+              <a:rPr lang="en-US" sz="1600" dirty="0">
+                <a:solidFill>
+                  <a:schemeClr val="bg1">
+                    <a:lumMod val="50000"/>
+                  </a:schemeClr>
+                </a:solidFill>
+              </a:rPr>
+              <a:t>Program Design</a:t>
+            </a:r>
+          </a:p>
+        </p:txBody>
+      </p:sp>
+      <p:pic>
+        <p:nvPicPr>
+          <p:cNvPr id="7" name="Picture 6">
+            <a:extLst>
+              <a:ext uri="{FF2B5EF4-FFF2-40B4-BE49-F238E27FC236}">
+                <a16:creationId xmlns:a16="http://schemas.microsoft.com/office/drawing/2014/main" id="{DC628792-DD8D-40F2-A902-626B95A7B002}"/>
+              </a:ext>
+            </a:extLst>
+          </p:cNvPr>
+          <p:cNvPicPr>
+            <a:picLocks noChangeAspect="1"/>
+          </p:cNvPicPr>
+          <p:nvPr/>
+        </p:nvPicPr>
+        <p:blipFill>
+          <a:blip r:embed="rId2"/>
+          <a:stretch>
+            <a:fillRect/>
+          </a:stretch>
+        </p:blipFill>
+        <p:spPr>
+          <a:xfrm>
+            <a:off x="3123216" y="1522373"/>
+            <a:ext cx="5945568" cy="4684105"/>
+          </a:xfrm>
+          <a:prstGeom prst="rect">
+            <a:avLst/>
+          </a:prstGeom>
+        </p:spPr>
+      </p:pic>
+    </p:spTree>
+    <p:extLst>
+      <p:ext uri="{BB962C8B-B14F-4D97-AF65-F5344CB8AC3E}">
+        <p14:creationId xmlns:p14="http://schemas.microsoft.com/office/powerpoint/2010/main" val="3507078451"/>
+      </p:ext>
+    </p:extLst>
+  </p:cSld>
+  <p:clrMapOvr>
+    <a:masterClrMapping/>
+  </p:clrMapOvr>
+</p:sld>
+</file>
+
+<file path=ppt/slides/slide5.xml><?xml version="1.0" encoding="utf-8"?>
+<p:sld xmlns:a="http://schemas.openxmlformats.org/drawingml/2006/main" xmlns:r="http://schemas.openxmlformats.org/officeDocument/2006/relationships" xmlns:p="http://schemas.openxmlformats.org/presentationml/2006/main">
+  <p:cSld>
+    <p:spTree>
+      <p:nvGrpSpPr>
+        <p:cNvPr id="1" name=""/>
+        <p:cNvGrpSpPr/>
+        <p:nvPr/>
+      </p:nvGrpSpPr>
+      <p:grpSpPr>
+        <a:xfrm>
+          <a:off x="0" y="0"/>
+          <a:ext cx="0" cy="0"/>
+          <a:chOff x="0" y="0"/>
+          <a:chExt cx="0" cy="0"/>
+        </a:xfrm>
+      </p:grpSpPr>
+      <p:sp>
+        <p:nvSpPr>
+          <p:cNvPr id="2" name="Title 1">
+            <a:extLst>
+              <a:ext uri="{FF2B5EF4-FFF2-40B4-BE49-F238E27FC236}">
+                <a16:creationId xmlns:a16="http://schemas.microsoft.com/office/drawing/2014/main" id="{DB2A7252-6823-44F9-B464-D7A15D12BB65}"/>
+              </a:ext>
+            </a:extLst>
+          </p:cNvPr>
+          <p:cNvSpPr>
+            <a:spLocks noGrp="1"/>
+          </p:cNvSpPr>
+          <p:nvPr>
+            <p:ph type="title"/>
+          </p:nvPr>
+        </p:nvSpPr>
+        <p:spPr/>
+        <p:txBody>
+          <a:bodyPr/>
+          <a:lstStyle/>
+          <a:p>
+            <a:r>
+              <a:rPr lang="en-US" dirty="0"/>
+              <a:t>Hierarchy Chart</a:t>
+            </a:r>
+          </a:p>
+        </p:txBody>
+      </p:sp>
+      <p:sp>
+        <p:nvSpPr>
+          <p:cNvPr id="5" name="Footer Placeholder 4">
+            <a:extLst>
+              <a:ext uri="{FF2B5EF4-FFF2-40B4-BE49-F238E27FC236}">
+                <a16:creationId xmlns:a16="http://schemas.microsoft.com/office/drawing/2014/main" id="{E05174E8-A6F1-B722-21E7-1FEB9E988BD2}"/>
+              </a:ext>
+            </a:extLst>
+          </p:cNvPr>
+          <p:cNvSpPr>
+            <a:spLocks noGrp="1"/>
+          </p:cNvSpPr>
+          <p:nvPr>
+            <p:ph type="ftr" sz="quarter" idx="11"/>
+          </p:nvPr>
+        </p:nvSpPr>
+        <p:spPr/>
+        <p:txBody>
+          <a:bodyPr/>
+          <a:lstStyle/>
+          <a:p>
+            <a:r>
+              <a:rPr lang="en-US"/>
+              <a:t>E Rodriguez</a:t>
+            </a:r>
+          </a:p>
+        </p:txBody>
+      </p:sp>
+      <p:sp>
+        <p:nvSpPr>
+          <p:cNvPr id="6" name="Slide Number Placeholder 5">
+            <a:extLst>
+              <a:ext uri="{FF2B5EF4-FFF2-40B4-BE49-F238E27FC236}">
+                <a16:creationId xmlns:a16="http://schemas.microsoft.com/office/drawing/2014/main" id="{ADE23920-66B9-14C6-BB52-1D96B8559CCF}"/>
+              </a:ext>
+            </a:extLst>
+          </p:cNvPr>
+          <p:cNvSpPr>
+            <a:spLocks noGrp="1"/>
+          </p:cNvSpPr>
+          <p:nvPr>
+            <p:ph type="sldNum" sz="quarter" idx="12"/>
+          </p:nvPr>
+        </p:nvSpPr>
+        <p:spPr/>
+        <p:txBody>
+          <a:bodyPr/>
+          <a:lstStyle/>
+          <a:p>
+            <a:fld id="{7BC5D697-CC64-4CAF-A466-D1105DD36B62}" type="slidenum">
+              <a:rPr lang="en-US" smtClean="0"/>
+              <a:t>5</a:t>
             </a:fld>
             <a:endParaRPr lang="en-US"/>
           </a:p>
@@ -8375,7 +8809,7 @@
 </p:sld>
 </file>
 
-<file path=ppt/slides/slide5.xml><?xml version="1.0" encoding="utf-8"?>
+<file path=ppt/slides/slide6.xml><?xml version="1.0" encoding="utf-8"?>
 <p:sld xmlns:a="http://schemas.openxmlformats.org/drawingml/2006/main" xmlns:r="http://schemas.openxmlformats.org/officeDocument/2006/relationships" xmlns:p="http://schemas.openxmlformats.org/presentationml/2006/main">
   <p:cSld>
     <p:spTree>
@@ -8471,7 +8905,7 @@
           <a:p>
             <a:fld id="{7BC5D697-CC64-4CAF-A466-D1105DD36B62}" type="slidenum">
               <a:rPr lang="en-US" smtClean="0"/>
-              <a:t>5</a:t>
+              <a:t>6</a:t>
             </a:fld>
             <a:endParaRPr lang="en-US"/>
           </a:p>
@@ -8586,7 +9020,7 @@
 </p:sld>
 </file>
 
-<file path=ppt/slides/slide6.xml><?xml version="1.0" encoding="utf-8"?>
+<file path=ppt/slides/slide7.xml><?xml version="1.0" encoding="utf-8"?>
 <p:sld xmlns:a="http://schemas.openxmlformats.org/drawingml/2006/main" xmlns:r="http://schemas.openxmlformats.org/officeDocument/2006/relationships" xmlns:p="http://schemas.openxmlformats.org/presentationml/2006/main">
   <p:cSld>
     <p:spTree>
@@ -8682,7 +9116,7 @@
           <a:p>
             <a:fld id="{7BC5D697-CC64-4CAF-A466-D1105DD36B62}" type="slidenum">
               <a:rPr lang="en-US" smtClean="0"/>
-              <a:t>6</a:t>
+              <a:t>7</a:t>
             </a:fld>
             <a:endParaRPr lang="en-US"/>
           </a:p>
@@ -8797,7 +9231,7 @@
 </p:sld>
 </file>
 
-<file path=ppt/slides/slide7.xml><?xml version="1.0" encoding="utf-8"?>
+<file path=ppt/slides/slide8.xml><?xml version="1.0" encoding="utf-8"?>
 <p:sld xmlns:a="http://schemas.openxmlformats.org/drawingml/2006/main" xmlns:r="http://schemas.openxmlformats.org/officeDocument/2006/relationships" xmlns:p="http://schemas.openxmlformats.org/presentationml/2006/main">
   <p:cSld>
     <p:spTree>
@@ -8893,7 +9327,7 @@
           <a:p>
             <a:fld id="{7BC5D697-CC64-4CAF-A466-D1105DD36B62}" type="slidenum">
               <a:rPr lang="en-US" smtClean="0"/>
-              <a:t>7</a:t>
+              <a:t>8</a:t>
             </a:fld>
             <a:endParaRPr lang="en-US"/>
           </a:p>
@@ -9008,7 +9442,7 @@
 </p:sld>
 </file>
 
-<file path=ppt/slides/slide8.xml><?xml version="1.0" encoding="utf-8"?>
+<file path=ppt/slides/slide9.xml><?xml version="1.0" encoding="utf-8"?>
 <p:sld xmlns:a="http://schemas.openxmlformats.org/drawingml/2006/main" xmlns:r="http://schemas.openxmlformats.org/officeDocument/2006/relationships" xmlns:p="http://schemas.openxmlformats.org/presentationml/2006/main">
   <p:cSld>
     <p:spTree>
@@ -9104,7 +9538,7 @@
           <a:p>
             <a:fld id="{7BC5D697-CC64-4CAF-A466-D1105DD36B62}" type="slidenum">
               <a:rPr lang="en-US" smtClean="0"/>
-              <a:t>8</a:t>
+              <a:t>9</a:t>
             </a:fld>
             <a:endParaRPr lang="en-US"/>
           </a:p>
@@ -9239,246 +9673,6 @@
     <p:extLst>
       <p:ext uri="{BB962C8B-B14F-4D97-AF65-F5344CB8AC3E}">
         <p14:creationId xmlns:p14="http://schemas.microsoft.com/office/powerpoint/2010/main" val="4110211979"/>
-      </p:ext>
-    </p:extLst>
-  </p:cSld>
-  <p:clrMapOvr>
-    <a:masterClrMapping/>
-  </p:clrMapOvr>
-</p:sld>
-</file>
-
-<file path=ppt/slides/slide9.xml><?xml version="1.0" encoding="utf-8"?>
-<p:sld xmlns:a="http://schemas.openxmlformats.org/drawingml/2006/main" xmlns:r="http://schemas.openxmlformats.org/officeDocument/2006/relationships" xmlns:p="http://schemas.openxmlformats.org/presentationml/2006/main">
-  <p:cSld>
-    <p:spTree>
-      <p:nvGrpSpPr>
-        <p:cNvPr id="1" name=""/>
-        <p:cNvGrpSpPr/>
-        <p:nvPr/>
-      </p:nvGrpSpPr>
-      <p:grpSpPr>
-        <a:xfrm>
-          <a:off x="0" y="0"/>
-          <a:ext cx="0" cy="0"/>
-          <a:chOff x="0" y="0"/>
-          <a:chExt cx="0" cy="0"/>
-        </a:xfrm>
-      </p:grpSpPr>
-      <p:sp>
-        <p:nvSpPr>
-          <p:cNvPr id="2" name="Title 1">
-            <a:extLst>
-              <a:ext uri="{FF2B5EF4-FFF2-40B4-BE49-F238E27FC236}">
-                <a16:creationId xmlns:a16="http://schemas.microsoft.com/office/drawing/2014/main" id="{DB2A7252-6823-44F9-B464-D7A15D12BB65}"/>
-              </a:ext>
-            </a:extLst>
-          </p:cNvPr>
-          <p:cNvSpPr>
-            <a:spLocks noGrp="1"/>
-          </p:cNvSpPr>
-          <p:nvPr>
-            <p:ph type="title"/>
-          </p:nvPr>
-        </p:nvSpPr>
-        <p:spPr/>
-        <p:txBody>
-          <a:bodyPr/>
-          <a:lstStyle/>
-          <a:p>
-            <a:r>
-              <a:rPr lang="en-US" dirty="0"/>
-              <a:t>Pseudocode, cont.</a:t>
-            </a:r>
-          </a:p>
-        </p:txBody>
-      </p:sp>
-      <p:sp>
-        <p:nvSpPr>
-          <p:cNvPr id="5" name="Footer Placeholder 4">
-            <a:extLst>
-              <a:ext uri="{FF2B5EF4-FFF2-40B4-BE49-F238E27FC236}">
-                <a16:creationId xmlns:a16="http://schemas.microsoft.com/office/drawing/2014/main" id="{E05174E8-A6F1-B722-21E7-1FEB9E988BD2}"/>
-              </a:ext>
-            </a:extLst>
-          </p:cNvPr>
-          <p:cNvSpPr>
-            <a:spLocks noGrp="1"/>
-          </p:cNvSpPr>
-          <p:nvPr>
-            <p:ph type="ftr" sz="quarter" idx="11"/>
-          </p:nvPr>
-        </p:nvSpPr>
-        <p:spPr/>
-        <p:txBody>
-          <a:bodyPr/>
-          <a:lstStyle/>
-          <a:p>
-            <a:r>
-              <a:rPr lang="en-US"/>
-              <a:t>E Rodriguez</a:t>
-            </a:r>
-          </a:p>
-        </p:txBody>
-      </p:sp>
-      <p:sp>
-        <p:nvSpPr>
-          <p:cNvPr id="6" name="Slide Number Placeholder 5">
-            <a:extLst>
-              <a:ext uri="{FF2B5EF4-FFF2-40B4-BE49-F238E27FC236}">
-                <a16:creationId xmlns:a16="http://schemas.microsoft.com/office/drawing/2014/main" id="{ADE23920-66B9-14C6-BB52-1D96B8559CCF}"/>
-              </a:ext>
-            </a:extLst>
-          </p:cNvPr>
-          <p:cNvSpPr>
-            <a:spLocks noGrp="1"/>
-          </p:cNvSpPr>
-          <p:nvPr>
-            <p:ph type="sldNum" sz="quarter" idx="12"/>
-          </p:nvPr>
-        </p:nvSpPr>
-        <p:spPr/>
-        <p:txBody>
-          <a:bodyPr/>
-          <a:lstStyle/>
-          <a:p>
-            <a:fld id="{7BC5D697-CC64-4CAF-A466-D1105DD36B62}" type="slidenum">
-              <a:rPr lang="en-US" smtClean="0"/>
-              <a:t>9</a:t>
-            </a:fld>
-            <a:endParaRPr lang="en-US"/>
-          </a:p>
-        </p:txBody>
-      </p:sp>
-      <p:sp>
-        <p:nvSpPr>
-          <p:cNvPr id="4" name="TextBox 3">
-            <a:extLst>
-              <a:ext uri="{FF2B5EF4-FFF2-40B4-BE49-F238E27FC236}">
-                <a16:creationId xmlns:a16="http://schemas.microsoft.com/office/drawing/2014/main" id="{48B42655-B426-E42E-6080-01EA0B1F1436}"/>
-              </a:ext>
-            </a:extLst>
-          </p:cNvPr>
-          <p:cNvSpPr txBox="1"/>
-          <p:nvPr/>
-        </p:nvSpPr>
-        <p:spPr>
-          <a:xfrm>
-            <a:off x="9035144" y="217714"/>
-            <a:ext cx="2743200" cy="338554"/>
-          </a:xfrm>
-          <a:prstGeom prst="rect">
-            <a:avLst/>
-          </a:prstGeom>
-          <a:noFill/>
-        </p:spPr>
-        <p:txBody>
-          <a:bodyPr wrap="square" rtlCol="0">
-            <a:spAutoFit/>
-          </a:bodyPr>
-          <a:lstStyle/>
-          <a:p>
-            <a:r>
-              <a:rPr lang="en-US" sz="1600" dirty="0">
-                <a:solidFill>
-                  <a:schemeClr val="bg1">
-                    <a:lumMod val="50000"/>
-                  </a:schemeClr>
-                </a:solidFill>
-              </a:rPr>
-              <a:t>Program Design</a:t>
-            </a:r>
-          </a:p>
-        </p:txBody>
-      </p:sp>
-      <p:sp>
-        <p:nvSpPr>
-          <p:cNvPr id="8" name="Content Placeholder 7">
-            <a:extLst>
-              <a:ext uri="{FF2B5EF4-FFF2-40B4-BE49-F238E27FC236}">
-                <a16:creationId xmlns:a16="http://schemas.microsoft.com/office/drawing/2014/main" id="{B81FC63E-1C1A-2B87-6EA1-726A19EFC7A9}"/>
-              </a:ext>
-            </a:extLst>
-          </p:cNvPr>
-          <p:cNvSpPr>
-            <a:spLocks noGrp="1"/>
-          </p:cNvSpPr>
-          <p:nvPr>
-            <p:ph idx="1"/>
-          </p:nvPr>
-        </p:nvSpPr>
-        <p:spPr/>
-        <p:txBody>
-          <a:bodyPr/>
-          <a:lstStyle/>
-          <a:p>
-            <a:endParaRPr lang="en-US"/>
-          </a:p>
-        </p:txBody>
-      </p:sp>
-      <p:pic>
-        <p:nvPicPr>
-          <p:cNvPr id="9" name="Picture 8">
-            <a:extLst>
-              <a:ext uri="{FF2B5EF4-FFF2-40B4-BE49-F238E27FC236}">
-                <a16:creationId xmlns:a16="http://schemas.microsoft.com/office/drawing/2014/main" id="{2DEED15B-C586-66F8-EA0F-B51BE14300D8}"/>
-              </a:ext>
-            </a:extLst>
-          </p:cNvPr>
-          <p:cNvPicPr>
-            <a:picLocks noChangeAspect="1"/>
-          </p:cNvPicPr>
-          <p:nvPr/>
-        </p:nvPicPr>
-        <p:blipFill rotWithShape="1">
-          <a:blip r:embed="rId2"/>
-          <a:srcRect l="65756" b="95135"/>
-          <a:stretch/>
-        </p:blipFill>
-        <p:spPr>
-          <a:xfrm>
-            <a:off x="5399315" y="1132144"/>
-            <a:ext cx="1766510" cy="275741"/>
-          </a:xfrm>
-          <a:prstGeom prst="rect">
-            <a:avLst/>
-          </a:prstGeom>
-        </p:spPr>
-      </p:pic>
-      <p:pic>
-        <p:nvPicPr>
-          <p:cNvPr id="7" name="Picture 6">
-            <a:extLst>
-              <a:ext uri="{FF2B5EF4-FFF2-40B4-BE49-F238E27FC236}">
-                <a16:creationId xmlns:a16="http://schemas.microsoft.com/office/drawing/2014/main" id="{6D6A1516-988E-C958-FEA1-F270BAADC913}"/>
-              </a:ext>
-            </a:extLst>
-          </p:cNvPr>
-          <p:cNvPicPr>
-            <a:picLocks noChangeAspect="1"/>
-          </p:cNvPicPr>
-          <p:nvPr/>
-        </p:nvPicPr>
-        <p:blipFill>
-          <a:blip r:embed="rId3"/>
-          <a:stretch>
-            <a:fillRect/>
-          </a:stretch>
-        </p:blipFill>
-        <p:spPr>
-          <a:xfrm>
-            <a:off x="2528600" y="1634088"/>
-            <a:ext cx="7507940" cy="4542875"/>
-          </a:xfrm>
-          <a:prstGeom prst="rect">
-            <a:avLst/>
-          </a:prstGeom>
-        </p:spPr>
-      </p:pic>
-    </p:spTree>
-    <p:extLst>
-      <p:ext uri="{BB962C8B-B14F-4D97-AF65-F5344CB8AC3E}">
-        <p14:creationId xmlns:p14="http://schemas.microsoft.com/office/powerpoint/2010/main" val="3121724213"/>
       </p:ext>
     </p:extLst>
   </p:cSld>

</xml_diff>